<commit_message>
Update How to execute the IMPC statistical pipeline.pptx
</commit_message>
<xml_diff>
--- a/Slides/How to execute the IMPC statistical pipeline.pptx
+++ b/Slides/How to execute the IMPC statistical pipeline.pptx
@@ -5,10 +5,10 @@
     <p:sldMasterId id="2147483673" r:id="rId1"/>
   </p:sldMasterIdLst>
   <p:notesMasterIdLst>
-    <p:notesMasterId r:id="rId12"/>
+    <p:notesMasterId r:id="rId14"/>
   </p:notesMasterIdLst>
   <p:handoutMasterIdLst>
-    <p:handoutMasterId r:id="rId13"/>
+    <p:handoutMasterId r:id="rId15"/>
   </p:handoutMasterIdLst>
   <p:sldIdLst>
     <p:sldId id="257" r:id="rId2"/>
@@ -19,8 +19,10 @@
     <p:sldId id="264" r:id="rId7"/>
     <p:sldId id="266" r:id="rId8"/>
     <p:sldId id="261" r:id="rId9"/>
-    <p:sldId id="262" r:id="rId10"/>
-    <p:sldId id="263" r:id="rId11"/>
+    <p:sldId id="267" r:id="rId10"/>
+    <p:sldId id="262" r:id="rId11"/>
+    <p:sldId id="263" r:id="rId12"/>
+    <p:sldId id="268" r:id="rId13"/>
   </p:sldIdLst>
   <p:sldSz cx="12192000" cy="6858000"/>
   <p:notesSz cx="6858000" cy="9144000"/>
@@ -5227,7 +5229,7 @@
           <a:p>
             <a:r>
               <a:rPr lang="en-GB" dirty="0"/>
-              <a:t>Run the extraction of risky genes pipeline</a:t>
+              <a:t>Run the report generating pipeline</a:t>
             </a:r>
           </a:p>
         </p:txBody>
@@ -5250,7 +5252,7 @@
         </p:nvSpPr>
         <p:spPr>
           <a:xfrm>
-            <a:off x="1066800" y="2014194"/>
+            <a:off x="1066800" y="1735567"/>
             <a:ext cx="10058400" cy="3849624"/>
           </a:xfrm>
         </p:spPr>
@@ -5265,16 +5267,16 @@
                 <a:latin typeface="Courier New" panose="02070309020205020404" pitchFamily="49" charset="0"/>
                 <a:cs typeface="Courier New" panose="02070309020205020404" pitchFamily="49" charset="0"/>
               </a:rPr>
-              <a:t>This process generates a list of risky genes to check manually</a:t>
-            </a:r>
-          </a:p>
-          <a:p>
-            <a:r>
-              <a:rPr lang="en-GB" sz="1100" dirty="0">
-                <a:latin typeface="Courier New" panose="02070309020205020404" pitchFamily="49" charset="0"/>
-                <a:cs typeface="Courier New" panose="02070309020205020404" pitchFamily="49" charset="0"/>
-              </a:rPr>
-              <a:t>Step:</a:t>
+              <a:t>This process is to create statistical reports that are normally used by the IMPC working groups</a:t>
+            </a:r>
+          </a:p>
+          <a:p>
+            <a:r>
+              <a:rPr lang="en-GB" sz="1100" b="1" dirty="0">
+                <a:latin typeface="Courier New" panose="02070309020205020404" pitchFamily="49" charset="0"/>
+                <a:cs typeface="Courier New" panose="02070309020205020404" pitchFamily="49" charset="0"/>
+              </a:rPr>
+              <a:t>Steps:</a:t>
             </a:r>
           </a:p>
           <a:p>
@@ -5287,22 +5289,89 @@
                 <a:latin typeface="Courier New" panose="02070309020205020404" pitchFamily="49" charset="0"/>
                 <a:cs typeface="Courier New" panose="02070309020205020404" pitchFamily="49" charset="0"/>
               </a:rPr>
-              <a:t>Allocate a machine on codon cluster, </a:t>
+              <a:t>Navigate to :/</a:t>
             </a:r>
             <a:r>
               <a:rPr lang="en-GB" sz="1100" dirty="0" err="1">
                 <a:latin typeface="Courier New" panose="02070309020205020404" pitchFamily="49" charset="0"/>
                 <a:cs typeface="Courier New" panose="02070309020205020404" pitchFamily="49" charset="0"/>
               </a:rPr>
-              <a:t>bsub</a:t>
-            </a:r>
-            <a:r>
-              <a:rPr lang="en-GB" sz="1100" dirty="0">
-                <a:latin typeface="Courier New" panose="02070309020205020404" pitchFamily="49" charset="0"/>
-                <a:cs typeface="Courier New" panose="02070309020205020404" pitchFamily="49" charset="0"/>
-              </a:rPr>
-              <a:t> –M 8000 –Is /bin/bash</a:t>
-            </a:r>
+              <a:t>nfs</a:t>
+            </a:r>
+            <a:r>
+              <a:rPr lang="en-GB" sz="1100" dirty="0">
+                <a:latin typeface="Courier New" panose="02070309020205020404" pitchFamily="49" charset="0"/>
+                <a:cs typeface="Courier New" panose="02070309020205020404" pitchFamily="49" charset="0"/>
+              </a:rPr>
+              <a:t>/production/</a:t>
+            </a:r>
+            <a:r>
+              <a:rPr lang="en-GB" sz="1100" dirty="0" err="1">
+                <a:latin typeface="Courier New" panose="02070309020205020404" pitchFamily="49" charset="0"/>
+                <a:cs typeface="Courier New" panose="02070309020205020404" pitchFamily="49" charset="0"/>
+              </a:rPr>
+              <a:t>tudor</a:t>
+            </a:r>
+            <a:r>
+              <a:rPr lang="en-GB" sz="1100" dirty="0">
+                <a:latin typeface="Courier New" panose="02070309020205020404" pitchFamily="49" charset="0"/>
+                <a:cs typeface="Courier New" panose="02070309020205020404" pitchFamily="49" charset="0"/>
+              </a:rPr>
+              <a:t>/</a:t>
+            </a:r>
+            <a:r>
+              <a:rPr lang="en-GB" sz="1100" dirty="0" err="1">
+                <a:latin typeface="Courier New" panose="02070309020205020404" pitchFamily="49" charset="0"/>
+                <a:cs typeface="Courier New" panose="02070309020205020404" pitchFamily="49" charset="0"/>
+              </a:rPr>
+              <a:t>komp</a:t>
+            </a:r>
+            <a:r>
+              <a:rPr lang="en-GB" sz="1100" dirty="0">
+                <a:latin typeface="Courier New" panose="02070309020205020404" pitchFamily="49" charset="0"/>
+                <a:cs typeface="Courier New" panose="02070309020205020404" pitchFamily="49" charset="0"/>
+              </a:rPr>
+              <a:t>/</a:t>
+            </a:r>
+            <a:r>
+              <a:rPr lang="en-GB" sz="1100" dirty="0" err="1">
+                <a:latin typeface="Courier New" panose="02070309020205020404" pitchFamily="49" charset="0"/>
+                <a:cs typeface="Courier New" panose="02070309020205020404" pitchFamily="49" charset="0"/>
+              </a:rPr>
+              <a:t>impc_statistical_pipeline</a:t>
+            </a:r>
+            <a:r>
+              <a:rPr lang="en-GB" sz="1100" dirty="0">
+                <a:latin typeface="Courier New" panose="02070309020205020404" pitchFamily="49" charset="0"/>
+                <a:cs typeface="Courier New" panose="02070309020205020404" pitchFamily="49" charset="0"/>
+              </a:rPr>
+              <a:t>/IMPC_DRs/</a:t>
+            </a:r>
+            <a:r>
+              <a:rPr lang="en-GB" sz="1100" b="1" dirty="0" err="1">
+                <a:latin typeface="Courier New" panose="02070309020205020404" pitchFamily="49" charset="0"/>
+                <a:cs typeface="Courier New" panose="02070309020205020404" pitchFamily="49" charset="0"/>
+              </a:rPr>
+              <a:t>stats_pipeline_input_drXX.y</a:t>
+            </a:r>
+            <a:r>
+              <a:rPr lang="en-GB" sz="1100" dirty="0">
+                <a:latin typeface="Courier New" panose="02070309020205020404" pitchFamily="49" charset="0"/>
+                <a:cs typeface="Courier New" panose="02070309020205020404" pitchFamily="49" charset="0"/>
+              </a:rPr>
+              <a:t>/SP/jobs/</a:t>
+            </a:r>
+            <a:r>
+              <a:rPr lang="en-GB" sz="1100" dirty="0" err="1">
+                <a:latin typeface="Courier New" panose="02070309020205020404" pitchFamily="49" charset="0"/>
+                <a:cs typeface="Courier New" panose="02070309020205020404" pitchFamily="49" charset="0"/>
+              </a:rPr>
+              <a:t>Results_IMPC_SP_Windowed</a:t>
+            </a:r>
+            <a:endParaRPr lang="en-GB" sz="1100" dirty="0">
+              <a:latin typeface="Courier New" panose="02070309020205020404" pitchFamily="49" charset="0"/>
+              <a:cs typeface="Courier New" panose="02070309020205020404" pitchFamily="49" charset="0"/>
+            </a:endParaRPr>
           </a:p>
           <a:p>
             <a:pPr marL="617220" lvl="1" indent="-342900">
@@ -5314,7 +5383,35 @@
                 <a:latin typeface="Courier New" panose="02070309020205020404" pitchFamily="49" charset="0"/>
                 <a:cs typeface="Courier New" panose="02070309020205020404" pitchFamily="49" charset="0"/>
               </a:rPr>
-              <a:t>Open an R session by typing R in the console</a:t>
+              <a:t>Allocate a high memory machine on cluster and initialise an interactive shell by following the following command: bsub –M 300000 –e </a:t>
+            </a:r>
+            <a:r>
+              <a:rPr lang="en-GB" sz="1100" dirty="0" err="1">
+                <a:latin typeface="Courier New" panose="02070309020205020404" pitchFamily="49" charset="0"/>
+                <a:cs typeface="Courier New" panose="02070309020205020404" pitchFamily="49" charset="0"/>
+              </a:rPr>
+              <a:t>errReportGeneratingPipeline</a:t>
+            </a:r>
+            <a:r>
+              <a:rPr lang="en-GB" sz="1100" dirty="0">
+                <a:latin typeface="Courier New" panose="02070309020205020404" pitchFamily="49" charset="0"/>
+                <a:cs typeface="Courier New" panose="02070309020205020404" pitchFamily="49" charset="0"/>
+              </a:rPr>
+              <a:t> –o </a:t>
+            </a:r>
+            <a:r>
+              <a:rPr lang="en-GB" sz="1100" dirty="0" err="1">
+                <a:latin typeface="Courier New" panose="02070309020205020404" pitchFamily="49" charset="0"/>
+                <a:cs typeface="Courier New" panose="02070309020205020404" pitchFamily="49" charset="0"/>
+              </a:rPr>
+              <a:t>outReportGeneratingPipeline</a:t>
+            </a:r>
+            <a:r>
+              <a:rPr lang="en-GB" sz="1100" dirty="0">
+                <a:latin typeface="Courier New" panose="02070309020205020404" pitchFamily="49" charset="0"/>
+                <a:cs typeface="Courier New" panose="02070309020205020404" pitchFamily="49" charset="0"/>
+              </a:rPr>
+              <a:t> –Is /bin/bash</a:t>
             </a:r>
           </a:p>
           <a:p>
@@ -5327,7 +5424,7 @@
                 <a:latin typeface="Courier New" panose="02070309020205020404" pitchFamily="49" charset="0"/>
                 <a:cs typeface="Courier New" panose="02070309020205020404" pitchFamily="49" charset="0"/>
               </a:rPr>
-              <a:t>Run the following command on the console:</a:t>
+              <a:t>Open an R session by typing R in your console (you need to make sure that this session is alive during the process or you can make a screen to keep it alive)</a:t>
             </a:r>
           </a:p>
           <a:p>
@@ -5336,6 +5433,16 @@
               <a:buAutoNum type="arabicPeriod"/>
             </a:pPr>
             <a:r>
+              <a:rPr lang="en-GB" sz="1100" dirty="0">
+                <a:latin typeface="Courier New" panose="02070309020205020404" pitchFamily="49" charset="0"/>
+                <a:cs typeface="Courier New" panose="02070309020205020404" pitchFamily="49" charset="0"/>
+              </a:rPr>
+              <a:t>Run the following commands in the R session:</a:t>
+            </a:r>
+          </a:p>
+          <a:p>
+            <a:pPr lvl="2"/>
+            <a:r>
               <a:rPr lang="en-GB" sz="1100" dirty="0" err="1">
                 <a:latin typeface="Courier New" panose="02070309020205020404" pitchFamily="49" charset="0"/>
                 <a:cs typeface="Courier New" panose="02070309020205020404" pitchFamily="49" charset="0"/>
@@ -5354,47 +5461,59 @@
                 <a:latin typeface="Courier New" panose="02070309020205020404" pitchFamily="49" charset="0"/>
                 <a:cs typeface="Courier New" panose="02070309020205020404" pitchFamily="49" charset="0"/>
               </a:rPr>
-              <a:t>extractRiskyGenesFromDRs</a:t>
-            </a:r>
-            <a:r>
-              <a:rPr lang="en-GB" sz="1100" dirty="0">
-                <a:latin typeface="Courier New" panose="02070309020205020404" pitchFamily="49" charset="0"/>
-                <a:cs typeface="Courier New" panose="02070309020205020404" pitchFamily="49" charset="0"/>
-              </a:rPr>
-              <a:t>(path to the </a:t>
-            </a:r>
+              <a:t>IMPC_statspipelinePostProcess</a:t>
+            </a:r>
+            <a:r>
+              <a:rPr lang="en-GB" sz="1100" dirty="0">
+                <a:latin typeface="Courier New" panose="02070309020205020404" pitchFamily="49" charset="0"/>
+                <a:cs typeface="Courier New" panose="02070309020205020404" pitchFamily="49" charset="0"/>
+              </a:rPr>
+              <a:t>()</a:t>
+            </a:r>
+          </a:p>
+          <a:p>
+            <a:pPr lvl="2"/>
             <a:r>
               <a:rPr lang="en-GB" sz="1100" dirty="0" err="1">
                 <a:latin typeface="Courier New" panose="02070309020205020404" pitchFamily="49" charset="0"/>
                 <a:cs typeface="Courier New" panose="02070309020205020404" pitchFamily="49" charset="0"/>
               </a:rPr>
-              <a:t>gzip</a:t>
-            </a:r>
-            <a:r>
-              <a:rPr lang="en-GB" sz="1100" dirty="0">
-                <a:latin typeface="Courier New" panose="02070309020205020404" pitchFamily="49" charset="0"/>
-                <a:cs typeface="Courier New" panose="02070309020205020404" pitchFamily="49" charset="0"/>
-              </a:rPr>
-              <a:t> report from the previous release, path to the new report on the current release)</a:t>
-            </a:r>
-          </a:p>
-          <a:p>
-            <a:pPr marL="891540" lvl="2" indent="-342900">
-              <a:buFont typeface="+mj-lt"/>
-              <a:buAutoNum type="arabicPeriod"/>
-            </a:pPr>
-            <a:r>
-              <a:rPr lang="en-GB" sz="1000" dirty="0">
-                <a:latin typeface="Courier New" panose="02070309020205020404" pitchFamily="49" charset="0"/>
-                <a:cs typeface="Courier New" panose="02070309020205020404" pitchFamily="49" charset="0"/>
-              </a:rPr>
-              <a:t>The inputs above can be URLs from the FTP site or absolute paths</a:t>
-            </a:r>
-          </a:p>
-          <a:p>
-            <a:pPr marL="274320" lvl="1" indent="0">
-              <a:buNone/>
-            </a:pPr>
+              <a:t>DRrequiredAgeing</a:t>
+            </a:r>
+            <a:r>
+              <a:rPr lang="en-GB" sz="1100" dirty="0">
+                <a:latin typeface="Courier New" panose="02070309020205020404" pitchFamily="49" charset="0"/>
+                <a:cs typeface="Courier New" panose="02070309020205020404" pitchFamily="49" charset="0"/>
+              </a:rPr>
+              <a:t>::: </a:t>
+            </a:r>
+            <a:r>
+              <a:rPr lang="en-GB" sz="1100" dirty="0" err="1">
+                <a:latin typeface="Courier New" panose="02070309020205020404" pitchFamily="49" charset="0"/>
+                <a:cs typeface="Courier New" panose="02070309020205020404" pitchFamily="49" charset="0"/>
+              </a:rPr>
+              <a:t>ClearReportsAfterCreation</a:t>
+            </a:r>
+            <a:r>
+              <a:rPr lang="en-GB" sz="1100" dirty="0">
+                <a:latin typeface="Courier New" panose="02070309020205020404" pitchFamily="49" charset="0"/>
+                <a:cs typeface="Courier New" panose="02070309020205020404" pitchFamily="49" charset="0"/>
+              </a:rPr>
+              <a:t>()</a:t>
+            </a:r>
+          </a:p>
+          <a:p>
+            <a:pPr lvl="1"/>
+            <a:r>
+              <a:rPr lang="en-GB" sz="1100" b="1" dirty="0">
+                <a:solidFill>
+                  <a:srgbClr val="2C481F"/>
+                </a:solidFill>
+                <a:latin typeface="Courier New" panose="02070309020205020404" pitchFamily="49" charset="0"/>
+                <a:cs typeface="Courier New" panose="02070309020205020404" pitchFamily="49" charset="0"/>
+              </a:rPr>
+              <a:t>► The </a:t>
+            </a:r>
             <a:r>
               <a:rPr lang="en-GB" sz="1100" b="1" kern="1200" dirty="0">
                 <a:solidFill>
@@ -5404,10 +5523,404 @@
                 <a:latin typeface="Courier New" panose="02070309020205020404" pitchFamily="49" charset="0"/>
                 <a:cs typeface="Courier New" panose="02070309020205020404" pitchFamily="49" charset="0"/>
               </a:rPr>
-              <a:t>► The output of this process is a file (in the current directory) RiskyGenesToCheck_[DATE].txt with each line a gene that should be </a:t>
-            </a:r>
-            <a:r>
-              <a:rPr lang="en-GB" sz="1100" b="1" kern="1200">
+              <a:t>commands above will generate two csv files in the </a:t>
+            </a:r>
+            <a:r>
+              <a:rPr lang="en-GB" sz="1100" dirty="0">
+                <a:latin typeface="Courier New" panose="02070309020205020404" pitchFamily="49" charset="0"/>
+                <a:cs typeface="Courier New" panose="02070309020205020404" pitchFamily="49" charset="0"/>
+              </a:rPr>
+              <a:t>:/</a:t>
+            </a:r>
+            <a:r>
+              <a:rPr lang="en-GB" sz="1100" dirty="0" err="1">
+                <a:latin typeface="Courier New" panose="02070309020205020404" pitchFamily="49" charset="0"/>
+                <a:cs typeface="Courier New" panose="02070309020205020404" pitchFamily="49" charset="0"/>
+              </a:rPr>
+              <a:t>nfs</a:t>
+            </a:r>
+            <a:r>
+              <a:rPr lang="en-GB" sz="1100" dirty="0">
+                <a:latin typeface="Courier New" panose="02070309020205020404" pitchFamily="49" charset="0"/>
+                <a:cs typeface="Courier New" panose="02070309020205020404" pitchFamily="49" charset="0"/>
+              </a:rPr>
+              <a:t>/production/</a:t>
+            </a:r>
+            <a:r>
+              <a:rPr lang="en-GB" sz="1100" dirty="0" err="1">
+                <a:latin typeface="Courier New" panose="02070309020205020404" pitchFamily="49" charset="0"/>
+                <a:cs typeface="Courier New" panose="02070309020205020404" pitchFamily="49" charset="0"/>
+              </a:rPr>
+              <a:t>tudor</a:t>
+            </a:r>
+            <a:r>
+              <a:rPr lang="en-GB" sz="1100" dirty="0">
+                <a:latin typeface="Courier New" panose="02070309020205020404" pitchFamily="49" charset="0"/>
+                <a:cs typeface="Courier New" panose="02070309020205020404" pitchFamily="49" charset="0"/>
+              </a:rPr>
+              <a:t>/</a:t>
+            </a:r>
+            <a:r>
+              <a:rPr lang="en-GB" sz="1100" dirty="0" err="1">
+                <a:latin typeface="Courier New" panose="02070309020205020404" pitchFamily="49" charset="0"/>
+                <a:cs typeface="Courier New" panose="02070309020205020404" pitchFamily="49" charset="0"/>
+              </a:rPr>
+              <a:t>komp</a:t>
+            </a:r>
+            <a:r>
+              <a:rPr lang="en-GB" sz="1100" dirty="0">
+                <a:latin typeface="Courier New" panose="02070309020205020404" pitchFamily="49" charset="0"/>
+                <a:cs typeface="Courier New" panose="02070309020205020404" pitchFamily="49" charset="0"/>
+              </a:rPr>
+              <a:t>/</a:t>
+            </a:r>
+            <a:r>
+              <a:rPr lang="en-GB" sz="1100" dirty="0" err="1">
+                <a:latin typeface="Courier New" panose="02070309020205020404" pitchFamily="49" charset="0"/>
+                <a:cs typeface="Courier New" panose="02070309020205020404" pitchFamily="49" charset="0"/>
+              </a:rPr>
+              <a:t>impc_statistical_pipeline</a:t>
+            </a:r>
+            <a:r>
+              <a:rPr lang="en-GB" sz="1100" dirty="0">
+                <a:latin typeface="Courier New" panose="02070309020205020404" pitchFamily="49" charset="0"/>
+                <a:cs typeface="Courier New" panose="02070309020205020404" pitchFamily="49" charset="0"/>
+              </a:rPr>
+              <a:t>/IMPC_DRs/</a:t>
+            </a:r>
+            <a:r>
+              <a:rPr lang="en-GB" sz="1100" b="1" dirty="0" err="1">
+                <a:latin typeface="Courier New" panose="02070309020205020404" pitchFamily="49" charset="0"/>
+                <a:cs typeface="Courier New" panose="02070309020205020404" pitchFamily="49" charset="0"/>
+              </a:rPr>
+              <a:t>stats_pipeline_input_drXX.y</a:t>
+            </a:r>
+            <a:r>
+              <a:rPr lang="en-GB" sz="1100" dirty="0">
+                <a:latin typeface="Courier New" panose="02070309020205020404" pitchFamily="49" charset="0"/>
+                <a:cs typeface="Courier New" panose="02070309020205020404" pitchFamily="49" charset="0"/>
+              </a:rPr>
+              <a:t>/SP/jobs/</a:t>
+            </a:r>
+            <a:r>
+              <a:rPr lang="en-GB" sz="1100" dirty="0" err="1">
+                <a:latin typeface="Courier New" panose="02070309020205020404" pitchFamily="49" charset="0"/>
+                <a:cs typeface="Courier New" panose="02070309020205020404" pitchFamily="49" charset="0"/>
+              </a:rPr>
+              <a:t>Results_IMPC_SP_Windowed</a:t>
+            </a:r>
+            <a:r>
+              <a:rPr lang="en-GB" sz="1100" dirty="0">
+                <a:latin typeface="Courier New" panose="02070309020205020404" pitchFamily="49" charset="0"/>
+                <a:cs typeface="Courier New" panose="02070309020205020404" pitchFamily="49" charset="0"/>
+              </a:rPr>
+              <a:t> directory for the </a:t>
+            </a:r>
+            <a:r>
+              <a:rPr lang="en-GB" sz="1100" b="1" dirty="0" err="1">
+                <a:latin typeface="Courier New" panose="02070309020205020404" pitchFamily="49" charset="0"/>
+                <a:cs typeface="Courier New" panose="02070309020205020404" pitchFamily="49" charset="0"/>
+              </a:rPr>
+              <a:t>unidimentional</a:t>
+            </a:r>
+            <a:r>
+              <a:rPr lang="en-GB" sz="1100" dirty="0">
+                <a:latin typeface="Courier New" panose="02070309020205020404" pitchFamily="49" charset="0"/>
+                <a:cs typeface="Courier New" panose="02070309020205020404" pitchFamily="49" charset="0"/>
+              </a:rPr>
+              <a:t> and </a:t>
+            </a:r>
+            <a:r>
+              <a:rPr lang="en-GB" sz="1100" b="1" dirty="0">
+                <a:latin typeface="Courier New" panose="02070309020205020404" pitchFamily="49" charset="0"/>
+                <a:cs typeface="Courier New" panose="02070309020205020404" pitchFamily="49" charset="0"/>
+              </a:rPr>
+              <a:t>categorical</a:t>
+            </a:r>
+            <a:r>
+              <a:rPr lang="en-GB" sz="1100" dirty="0">
+                <a:latin typeface="Courier New" panose="02070309020205020404" pitchFamily="49" charset="0"/>
+                <a:cs typeface="Courier New" panose="02070309020205020404" pitchFamily="49" charset="0"/>
+              </a:rPr>
+              <a:t> results. The files can be </a:t>
+            </a:r>
+            <a:r>
+              <a:rPr lang="en-GB" sz="1100" b="1" dirty="0" err="1">
+                <a:latin typeface="Courier New" panose="02070309020205020404" pitchFamily="49" charset="0"/>
+                <a:cs typeface="Courier New" panose="02070309020205020404" pitchFamily="49" charset="0"/>
+              </a:rPr>
+              <a:t>gzip</a:t>
+            </a:r>
+            <a:r>
+              <a:rPr lang="en-GB" sz="1100" dirty="0">
+                <a:latin typeface="Courier New" panose="02070309020205020404" pitchFamily="49" charset="0"/>
+                <a:cs typeface="Courier New" panose="02070309020205020404" pitchFamily="49" charset="0"/>
+              </a:rPr>
+              <a:t> and moved to the FTP directory. You can decorate and format the files by using one of the formatted files in the previous data releases.</a:t>
+            </a:r>
+          </a:p>
+          <a:p>
+            <a:pPr lvl="2"/>
+            <a:endParaRPr lang="en-GB" sz="1400" dirty="0">
+              <a:latin typeface="Courier New" panose="02070309020205020404" pitchFamily="49" charset="0"/>
+              <a:cs typeface="Courier New" panose="02070309020205020404" pitchFamily="49" charset="0"/>
+            </a:endParaRPr>
+          </a:p>
+        </p:txBody>
+      </p:sp>
+      <p:sp>
+        <p:nvSpPr>
+          <p:cNvPr id="4" name="Date Placeholder 3">
+            <a:extLst>
+              <a:ext uri="{FF2B5EF4-FFF2-40B4-BE49-F238E27FC236}">
+                <a16:creationId xmlns:a16="http://schemas.microsoft.com/office/drawing/2014/main" id="{8E297709-FD23-B3A8-0B3B-3B60227D290E}"/>
+              </a:ext>
+            </a:extLst>
+          </p:cNvPr>
+          <p:cNvSpPr>
+            <a:spLocks noGrp="1"/>
+          </p:cNvSpPr>
+          <p:nvPr>
+            <p:ph type="dt" sz="half" idx="10"/>
+          </p:nvPr>
+        </p:nvSpPr>
+        <p:spPr/>
+        <p:txBody>
+          <a:bodyPr/>
+          <a:lstStyle/>
+          <a:p>
+            <a:pPr rtl="0"/>
+            <a:fld id="{6AF379E8-AC6C-43B9-9222-BDF0AF9336F0}" type="datetime1">
+              <a:rPr lang="en-US" smtClean="0"/>
+              <a:t>6/13/2023</a:t>
+            </a:fld>
+            <a:endParaRPr lang="en-US"/>
+          </a:p>
+        </p:txBody>
+      </p:sp>
+    </p:spTree>
+    <p:extLst>
+      <p:ext uri="{BB962C8B-B14F-4D97-AF65-F5344CB8AC3E}">
+        <p14:creationId xmlns:p14="http://schemas.microsoft.com/office/powerpoint/2010/main" val="1791507408"/>
+      </p:ext>
+    </p:extLst>
+  </p:cSld>
+  <p:clrMapOvr>
+    <a:masterClrMapping/>
+  </p:clrMapOvr>
+</p:sld>
+</file>
+
+<file path=ppt/slides/slide11.xml><?xml version="1.0" encoding="utf-8"?>
+<p:sld xmlns:a="http://schemas.openxmlformats.org/drawingml/2006/main" xmlns:r="http://schemas.openxmlformats.org/officeDocument/2006/relationships" xmlns:p="http://schemas.openxmlformats.org/presentationml/2006/main">
+  <p:cSld>
+    <p:spTree>
+      <p:nvGrpSpPr>
+        <p:cNvPr id="1" name=""/>
+        <p:cNvGrpSpPr/>
+        <p:nvPr/>
+      </p:nvGrpSpPr>
+      <p:grpSpPr>
+        <a:xfrm>
+          <a:off x="0" y="0"/>
+          <a:ext cx="0" cy="0"/>
+          <a:chOff x="0" y="0"/>
+          <a:chExt cx="0" cy="0"/>
+        </a:xfrm>
+      </p:grpSpPr>
+      <p:sp>
+        <p:nvSpPr>
+          <p:cNvPr id="2" name="Title 1">
+            <a:extLst>
+              <a:ext uri="{FF2B5EF4-FFF2-40B4-BE49-F238E27FC236}">
+                <a16:creationId xmlns:a16="http://schemas.microsoft.com/office/drawing/2014/main" id="{AF2BE95B-DDF1-5FBC-254E-875503A29DC2}"/>
+              </a:ext>
+            </a:extLst>
+          </p:cNvPr>
+          <p:cNvSpPr>
+            <a:spLocks noGrp="1"/>
+          </p:cNvSpPr>
+          <p:nvPr>
+            <p:ph type="title"/>
+          </p:nvPr>
+        </p:nvSpPr>
+        <p:spPr/>
+        <p:txBody>
+          <a:bodyPr/>
+          <a:lstStyle/>
+          <a:p>
+            <a:r>
+              <a:rPr lang="en-GB" dirty="0"/>
+              <a:t>Run the extraction of risky genes pipeline</a:t>
+            </a:r>
+          </a:p>
+        </p:txBody>
+      </p:sp>
+      <p:sp>
+        <p:nvSpPr>
+          <p:cNvPr id="3" name="Content Placeholder 2">
+            <a:extLst>
+              <a:ext uri="{FF2B5EF4-FFF2-40B4-BE49-F238E27FC236}">
+                <a16:creationId xmlns:a16="http://schemas.microsoft.com/office/drawing/2014/main" id="{382E34FA-2F10-59F2-D739-E3D164821BD2}"/>
+              </a:ext>
+            </a:extLst>
+          </p:cNvPr>
+          <p:cNvSpPr>
+            <a:spLocks noGrp="1"/>
+          </p:cNvSpPr>
+          <p:nvPr>
+            <p:ph idx="1"/>
+          </p:nvPr>
+        </p:nvSpPr>
+        <p:spPr>
+          <a:xfrm>
+            <a:off x="1066800" y="2014194"/>
+            <a:ext cx="10058400" cy="3849624"/>
+          </a:xfrm>
+        </p:spPr>
+        <p:txBody>
+          <a:bodyPr>
+            <a:normAutofit/>
+          </a:bodyPr>
+          <a:lstStyle/>
+          <a:p>
+            <a:r>
+              <a:rPr lang="en-GB" sz="1100" dirty="0">
+                <a:latin typeface="Courier New" panose="02070309020205020404" pitchFamily="49" charset="0"/>
+                <a:cs typeface="Courier New" panose="02070309020205020404" pitchFamily="49" charset="0"/>
+              </a:rPr>
+              <a:t>This process generates a list of risky genes to check manually</a:t>
+            </a:r>
+          </a:p>
+          <a:p>
+            <a:r>
+              <a:rPr lang="en-GB" sz="1100" dirty="0">
+                <a:latin typeface="Courier New" panose="02070309020205020404" pitchFamily="49" charset="0"/>
+                <a:cs typeface="Courier New" panose="02070309020205020404" pitchFamily="49" charset="0"/>
+              </a:rPr>
+              <a:t>Steps:</a:t>
+            </a:r>
+          </a:p>
+          <a:p>
+            <a:pPr marL="617220" lvl="1" indent="-342900">
+              <a:buFont typeface="+mj-lt"/>
+              <a:buAutoNum type="arabicPeriod"/>
+            </a:pPr>
+            <a:r>
+              <a:rPr lang="en-GB" sz="1100" dirty="0">
+                <a:latin typeface="Courier New" panose="02070309020205020404" pitchFamily="49" charset="0"/>
+                <a:cs typeface="Courier New" panose="02070309020205020404" pitchFamily="49" charset="0"/>
+              </a:rPr>
+              <a:t>Allocate a machine on codon cluster, </a:t>
+            </a:r>
+            <a:r>
+              <a:rPr lang="en-GB" sz="1100" dirty="0" err="1">
+                <a:latin typeface="Courier New" panose="02070309020205020404" pitchFamily="49" charset="0"/>
+                <a:cs typeface="Courier New" panose="02070309020205020404" pitchFamily="49" charset="0"/>
+              </a:rPr>
+              <a:t>bsub</a:t>
+            </a:r>
+            <a:r>
+              <a:rPr lang="en-GB" sz="1100" dirty="0">
+                <a:latin typeface="Courier New" panose="02070309020205020404" pitchFamily="49" charset="0"/>
+                <a:cs typeface="Courier New" panose="02070309020205020404" pitchFamily="49" charset="0"/>
+              </a:rPr>
+              <a:t> –M 8000 –Is /bin/bash</a:t>
+            </a:r>
+          </a:p>
+          <a:p>
+            <a:pPr marL="617220" lvl="1" indent="-342900">
+              <a:buFont typeface="+mj-lt"/>
+              <a:buAutoNum type="arabicPeriod"/>
+            </a:pPr>
+            <a:r>
+              <a:rPr lang="en-GB" sz="1100" dirty="0">
+                <a:latin typeface="Courier New" panose="02070309020205020404" pitchFamily="49" charset="0"/>
+                <a:cs typeface="Courier New" panose="02070309020205020404" pitchFamily="49" charset="0"/>
+              </a:rPr>
+              <a:t>Open an R session by typing R in the console</a:t>
+            </a:r>
+          </a:p>
+          <a:p>
+            <a:pPr marL="617220" lvl="1" indent="-342900">
+              <a:buFont typeface="+mj-lt"/>
+              <a:buAutoNum type="arabicPeriod"/>
+            </a:pPr>
+            <a:r>
+              <a:rPr lang="en-GB" sz="1100" dirty="0">
+                <a:latin typeface="Courier New" panose="02070309020205020404" pitchFamily="49" charset="0"/>
+                <a:cs typeface="Courier New" panose="02070309020205020404" pitchFamily="49" charset="0"/>
+              </a:rPr>
+              <a:t>Run the following command in the console:</a:t>
+            </a:r>
+          </a:p>
+          <a:p>
+            <a:pPr marL="617220" lvl="1" indent="-342900">
+              <a:buFont typeface="+mj-lt"/>
+              <a:buAutoNum type="arabicPeriod"/>
+            </a:pPr>
+            <a:r>
+              <a:rPr lang="en-GB" sz="1100" dirty="0" err="1">
+                <a:latin typeface="Courier New" panose="02070309020205020404" pitchFamily="49" charset="0"/>
+                <a:cs typeface="Courier New" panose="02070309020205020404" pitchFamily="49" charset="0"/>
+              </a:rPr>
+              <a:t>DRrequiredAgeing</a:t>
+            </a:r>
+            <a:r>
+              <a:rPr lang="en-GB" sz="1100" dirty="0">
+                <a:latin typeface="Courier New" panose="02070309020205020404" pitchFamily="49" charset="0"/>
+                <a:cs typeface="Courier New" panose="02070309020205020404" pitchFamily="49" charset="0"/>
+              </a:rPr>
+              <a:t>:::</a:t>
+            </a:r>
+            <a:r>
+              <a:rPr lang="en-GB" sz="1100" dirty="0" err="1">
+                <a:latin typeface="Courier New" panose="02070309020205020404" pitchFamily="49" charset="0"/>
+                <a:cs typeface="Courier New" panose="02070309020205020404" pitchFamily="49" charset="0"/>
+              </a:rPr>
+              <a:t>extractRiskyGenesFromDRs</a:t>
+            </a:r>
+            <a:r>
+              <a:rPr lang="en-GB" sz="1100" dirty="0">
+                <a:latin typeface="Courier New" panose="02070309020205020404" pitchFamily="49" charset="0"/>
+                <a:cs typeface="Courier New" panose="02070309020205020404" pitchFamily="49" charset="0"/>
+              </a:rPr>
+              <a:t>(‘path to the </a:t>
+            </a:r>
+            <a:r>
+              <a:rPr lang="en-GB" sz="1100" dirty="0" err="1">
+                <a:latin typeface="Courier New" panose="02070309020205020404" pitchFamily="49" charset="0"/>
+                <a:cs typeface="Courier New" panose="02070309020205020404" pitchFamily="49" charset="0"/>
+              </a:rPr>
+              <a:t>gzip</a:t>
+            </a:r>
+            <a:r>
+              <a:rPr lang="en-GB" sz="1100" dirty="0">
+                <a:latin typeface="Courier New" panose="02070309020205020404" pitchFamily="49" charset="0"/>
+                <a:cs typeface="Courier New" panose="02070309020205020404" pitchFamily="49" charset="0"/>
+              </a:rPr>
+              <a:t> report from the NEW release’, ‘path to the new report on the OLD release’)</a:t>
+            </a:r>
+          </a:p>
+          <a:p>
+            <a:pPr marL="891540" lvl="2" indent="-342900">
+              <a:buFont typeface="+mj-lt"/>
+              <a:buAutoNum type="arabicPeriod"/>
+            </a:pPr>
+            <a:r>
+              <a:rPr lang="en-GB" sz="1000" dirty="0">
+                <a:latin typeface="Courier New" panose="02070309020205020404" pitchFamily="49" charset="0"/>
+                <a:cs typeface="Courier New" panose="02070309020205020404" pitchFamily="49" charset="0"/>
+              </a:rPr>
+              <a:t>You may need to transfer the old reports to a path to make it accessible for the pipeline</a:t>
+            </a:r>
+          </a:p>
+          <a:p>
+            <a:pPr marL="274320" lvl="1" indent="0">
+              <a:buNone/>
+            </a:pPr>
+            <a:r>
+              <a:rPr lang="en-GB" sz="1100" b="1" kern="1200" dirty="0">
                 <a:solidFill>
                   <a:srgbClr val="2C481F"/>
                 </a:solidFill>
@@ -5415,7 +5928,7 @@
                 <a:latin typeface="Courier New" panose="02070309020205020404" pitchFamily="49" charset="0"/>
                 <a:cs typeface="Courier New" panose="02070309020205020404" pitchFamily="49" charset="0"/>
               </a:rPr>
-              <a:t>manually checked</a:t>
+              <a:t>► The output of this process is a file (in the current directory) RiskyGenesToCheck_[DATE].txt with each line a gene that should be manually checked</a:t>
             </a:r>
             <a:endParaRPr lang="en-GB" sz="1100" dirty="0">
               <a:latin typeface="Courier New" panose="02070309020205020404" pitchFamily="49" charset="0"/>
@@ -5475,6 +5988,119 @@
     <p:extLst>
       <p:ext uri="{BB962C8B-B14F-4D97-AF65-F5344CB8AC3E}">
         <p14:creationId xmlns:p14="http://schemas.microsoft.com/office/powerpoint/2010/main" val="1913377309"/>
+      </p:ext>
+    </p:extLst>
+  </p:cSld>
+  <p:clrMapOvr>
+    <a:masterClrMapping/>
+  </p:clrMapOvr>
+</p:sld>
+</file>
+
+<file path=ppt/slides/slide12.xml><?xml version="1.0" encoding="utf-8"?>
+<p:sld xmlns:a="http://schemas.openxmlformats.org/drawingml/2006/main" xmlns:r="http://schemas.openxmlformats.org/officeDocument/2006/relationships" xmlns:p="http://schemas.openxmlformats.org/presentationml/2006/main">
+  <p:cSld>
+    <p:spTree>
+      <p:nvGrpSpPr>
+        <p:cNvPr id="1" name=""/>
+        <p:cNvGrpSpPr/>
+        <p:nvPr/>
+      </p:nvGrpSpPr>
+      <p:grpSpPr>
+        <a:xfrm>
+          <a:off x="0" y="0"/>
+          <a:ext cx="0" cy="0"/>
+          <a:chOff x="0" y="0"/>
+          <a:chExt cx="0" cy="0"/>
+        </a:xfrm>
+      </p:grpSpPr>
+      <p:sp>
+        <p:nvSpPr>
+          <p:cNvPr id="2" name="Title 1">
+            <a:extLst>
+              <a:ext uri="{FF2B5EF4-FFF2-40B4-BE49-F238E27FC236}">
+                <a16:creationId xmlns:a16="http://schemas.microsoft.com/office/drawing/2014/main" id="{85D91A1E-5186-D7A8-1323-D1E319EED8CA}"/>
+              </a:ext>
+            </a:extLst>
+          </p:cNvPr>
+          <p:cNvSpPr>
+            <a:spLocks noGrp="1"/>
+          </p:cNvSpPr>
+          <p:nvPr>
+            <p:ph type="title"/>
+          </p:nvPr>
+        </p:nvSpPr>
+        <p:spPr/>
+        <p:txBody>
+          <a:bodyPr/>
+          <a:lstStyle/>
+          <a:p>
+            <a:r>
+              <a:rPr lang="en-GB" dirty="0"/>
+              <a:t>END</a:t>
+            </a:r>
+          </a:p>
+        </p:txBody>
+      </p:sp>
+      <p:sp>
+        <p:nvSpPr>
+          <p:cNvPr id="3" name="Content Placeholder 2">
+            <a:extLst>
+              <a:ext uri="{FF2B5EF4-FFF2-40B4-BE49-F238E27FC236}">
+                <a16:creationId xmlns:a16="http://schemas.microsoft.com/office/drawing/2014/main" id="{2739F4F0-8574-7926-D336-267796AA2C88}"/>
+              </a:ext>
+            </a:extLst>
+          </p:cNvPr>
+          <p:cNvSpPr>
+            <a:spLocks noGrp="1"/>
+          </p:cNvSpPr>
+          <p:nvPr>
+            <p:ph idx="1"/>
+          </p:nvPr>
+        </p:nvSpPr>
+        <p:spPr/>
+        <p:txBody>
+          <a:bodyPr/>
+          <a:lstStyle/>
+          <a:p>
+            <a:endParaRPr lang="en-GB" dirty="0"/>
+          </a:p>
+        </p:txBody>
+      </p:sp>
+      <p:sp>
+        <p:nvSpPr>
+          <p:cNvPr id="4" name="Date Placeholder 3">
+            <a:extLst>
+              <a:ext uri="{FF2B5EF4-FFF2-40B4-BE49-F238E27FC236}">
+                <a16:creationId xmlns:a16="http://schemas.microsoft.com/office/drawing/2014/main" id="{0CF16832-EDFE-6916-7E3C-8E8B8FD658E7}"/>
+              </a:ext>
+            </a:extLst>
+          </p:cNvPr>
+          <p:cNvSpPr>
+            <a:spLocks noGrp="1"/>
+          </p:cNvSpPr>
+          <p:nvPr>
+            <p:ph type="dt" sz="half" idx="10"/>
+          </p:nvPr>
+        </p:nvSpPr>
+        <p:spPr/>
+        <p:txBody>
+          <a:bodyPr/>
+          <a:lstStyle/>
+          <a:p>
+            <a:pPr rtl="0"/>
+            <a:fld id="{6AF379E8-AC6C-43B9-9222-BDF0AF9336F0}" type="datetime1">
+              <a:rPr lang="en-US" smtClean="0"/>
+              <a:t>6/13/2023</a:t>
+            </a:fld>
+            <a:endParaRPr lang="en-US"/>
+          </a:p>
+        </p:txBody>
+      </p:sp>
+    </p:spTree>
+    <p:extLst>
+      <p:ext uri="{BB962C8B-B14F-4D97-AF65-F5344CB8AC3E}">
+        <p14:creationId xmlns:p14="http://schemas.microsoft.com/office/powerpoint/2010/main" val="2988878772"/>
       </p:ext>
     </p:extLst>
   </p:cSld>
@@ -5524,7 +6150,7 @@
           <a:p>
             <a:r>
               <a:rPr lang="en-GB" dirty="0"/>
-              <a:t>Stage ad Steps</a:t>
+              <a:t>Stages and Steps</a:t>
             </a:r>
           </a:p>
         </p:txBody>
@@ -5925,7 +6551,7 @@
                 <a:latin typeface="Courier New" panose="02070309020205020404" pitchFamily="49" charset="0"/>
                 <a:cs typeface="Courier New" panose="02070309020205020404" pitchFamily="49" charset="0"/>
               </a:rPr>
-              <a:t>Assume the path to the </a:t>
+              <a:t>Let the path to the </a:t>
             </a:r>
             <a:r>
               <a:rPr lang="en-GB" sz="1100" dirty="0" err="1">
@@ -5939,7 +6565,7 @@
                 <a:latin typeface="Courier New" panose="02070309020205020404" pitchFamily="49" charset="0"/>
                 <a:cs typeface="Courier New" panose="02070309020205020404" pitchFamily="49" charset="0"/>
               </a:rPr>
-              <a:t> is </a:t>
+              <a:t> be </a:t>
             </a:r>
             <a:r>
               <a:rPr lang="en-GB" sz="1100" dirty="0" err="1">
@@ -6079,7 +6705,7 @@
                 <a:latin typeface="Courier New" panose="02070309020205020404" pitchFamily="49" charset="0"/>
                 <a:cs typeface="Courier New" panose="02070309020205020404" pitchFamily="49" charset="0"/>
               </a:rPr>
-              <a:t>Open and R session by typing R in the console</a:t>
+              <a:t>Open an R session by typing R in the console</a:t>
             </a:r>
           </a:p>
           <a:p>
@@ -6640,7 +7266,7 @@
                 <a:latin typeface="Courier New" panose="02070309020205020404" pitchFamily="49" charset="0"/>
                 <a:cs typeface="Courier New" panose="02070309020205020404" pitchFamily="49" charset="0"/>
               </a:rPr>
-              <a:t>Run the following. This will update the pipeline to the latest version. </a:t>
+              <a:t>Run the following command. This will update the pipeline to the latest version. </a:t>
             </a:r>
             <a:r>
               <a:rPr lang="en-GB" sz="1100" b="1" dirty="0" err="1">
@@ -7031,7 +7657,7 @@
           <a:lstStyle/>
           <a:p>
             <a:r>
-              <a:rPr lang="en-GB" dirty="0"/>
+              <a:rPr lang="en-GB" b="1" dirty="0"/>
               <a:t>How to figure out the pipeline is running?</a:t>
             </a:r>
           </a:p>
@@ -7059,7 +7685,7 @@
           </a:p>
           <a:p>
             <a:r>
-              <a:rPr lang="en-GB" dirty="0"/>
+              <a:rPr lang="en-GB" b="1" dirty="0"/>
               <a:t>How to figure out if this step is finished?</a:t>
             </a:r>
           </a:p>
@@ -7076,8 +7702,8 @@
           </a:p>
           <a:p>
             <a:r>
-              <a:rPr lang="en-GB" dirty="0"/>
-              <a:t>How to get errors from the pipeline?</a:t>
+              <a:rPr lang="en-GB" b="1" dirty="0"/>
+              <a:t>How to get logs from the pipeline?</a:t>
             </a:r>
           </a:p>
           <a:p>
@@ -7110,7 +7736,7 @@
             <a:pPr lvl="1"/>
             <a:r>
               <a:rPr lang="en-GB" b="1" dirty="0"/>
-              <a:t>The long answer (only If the pipeline failed). </a:t>
+              <a:t>The long answer (only If the pipeline failed in the middle of the process). </a:t>
             </a:r>
             <a:r>
               <a:rPr lang="en-GB" dirty="0"/>
@@ -7447,23 +8073,7 @@
           <a:p>
             <a:r>
               <a:rPr lang="en-GB" dirty="0"/>
-              <a:t>There are very </a:t>
-            </a:r>
-            <a:r>
-              <a:rPr lang="en-GB" dirty="0" err="1"/>
-              <a:t>ratre</a:t>
-            </a:r>
-            <a:r>
-              <a:rPr lang="en-GB" dirty="0"/>
-              <a:t> cases that the </a:t>
-            </a:r>
-            <a:r>
-              <a:rPr lang="en-GB" dirty="0" err="1"/>
-              <a:t>statspipeline</a:t>
-            </a:r>
-            <a:r>
-              <a:rPr lang="en-GB" dirty="0"/>
-              <a:t> fails with unknown reasons. The easiest way to continue the pipeline from where it failed is to use the </a:t>
+              <a:t>There are very rare cases that the stats pipeline fails with unknown reason. The easiest way to continue the pipeline from where it failed is to use the </a:t>
             </a:r>
             <a:r>
               <a:rPr lang="en-GB" dirty="0" err="1"/>
@@ -7520,7 +8130,7 @@
                 <a:latin typeface="Courier New" panose="02070309020205020404" pitchFamily="49" charset="0"/>
                 <a:cs typeface="Courier New" panose="02070309020205020404" pitchFamily="49" charset="0"/>
               </a:rPr>
-              <a:t> and make the parameter “</a:t>
+              <a:t> and change the parameter “</a:t>
             </a:r>
             <a:r>
               <a:rPr lang="en-GB" sz="1600" b="1" dirty="0" err="1">
@@ -7549,7 +8159,7 @@
                 <a:latin typeface="Courier New" panose="02070309020205020404" pitchFamily="49" charset="0"/>
                 <a:cs typeface="Courier New" panose="02070309020205020404" pitchFamily="49" charset="0"/>
               </a:rPr>
-              <a:t>The run the pipeline by executing ./</a:t>
+              <a:t>Then run the pipeline by executing ./</a:t>
             </a:r>
             <a:r>
               <a:rPr lang="en-GB" sz="1600" b="1" dirty="0" err="1">
@@ -7720,7 +8330,7 @@
           <a:p>
             <a:r>
               <a:rPr lang="en-GB" sz="1100" dirty="0"/>
-              <a:t>Step:</a:t>
+              <a:t>Steps:</a:t>
             </a:r>
           </a:p>
           <a:p>
@@ -7864,7 +8474,7 @@
                 <a:latin typeface="Courier New" panose="02070309020205020404" pitchFamily="49" charset="0"/>
                 <a:cs typeface="Courier New" panose="02070309020205020404" pitchFamily="49" charset="0"/>
               </a:rPr>
-              <a:t>HadoopReTransfer</a:t>
+              <a:t>IMPC_HadoopLoad</a:t>
             </a:r>
             <a:r>
               <a:rPr lang="en-GB" sz="1100" dirty="0">
@@ -7929,7 +8539,27 @@
                 <a:latin typeface="Courier New" panose="02070309020205020404" pitchFamily="49" charset="0"/>
                 <a:cs typeface="Courier New" panose="02070309020205020404" pitchFamily="49" charset="0"/>
               </a:rPr>
-              <a:t>/user/[USERNAME]/</a:t>
+              <a:t>/user/</a:t>
+            </a:r>
+            <a:r>
+              <a:rPr lang="en-GB" sz="1100" b="1" dirty="0" err="1">
+                <a:solidFill>
+                  <a:srgbClr val="2C481F"/>
+                </a:solidFill>
+                <a:latin typeface="Courier New" panose="02070309020205020404" pitchFamily="49" charset="0"/>
+                <a:cs typeface="Courier New" panose="02070309020205020404" pitchFamily="49" charset="0"/>
+              </a:rPr>
+              <a:t>mi_stats</a:t>
+            </a:r>
+            <a:r>
+              <a:rPr lang="en-GB" sz="1100" b="1" dirty="0">
+                <a:solidFill>
+                  <a:srgbClr val="2C481F"/>
+                </a:solidFill>
+                <a:latin typeface="Courier New" panose="02070309020205020404" pitchFamily="49" charset="0"/>
+                <a:cs typeface="Courier New" panose="02070309020205020404" pitchFamily="49" charset="0"/>
+              </a:rPr>
+              <a:t>/</a:t>
             </a:r>
             <a:r>
               <a:rPr lang="en-GB" sz="1100" b="1" dirty="0" err="1">
@@ -8005,7 +8635,7 @@
                 <a:latin typeface="Courier New" panose="02070309020205020404" pitchFamily="49" charset="0"/>
                 <a:cs typeface="Courier New" panose="02070309020205020404" pitchFamily="49" charset="0"/>
               </a:rPr>
-              <a:t> command to transfer files to Hadoop manually</a:t>
+              <a:t> command to transfer files to the Hadoop cluster manually</a:t>
             </a:r>
           </a:p>
           <a:p>
@@ -8103,7 +8733,7 @@
           <p:cNvPr id="2" name="Title 1">
             <a:extLst>
               <a:ext uri="{FF2B5EF4-FFF2-40B4-BE49-F238E27FC236}">
-                <a16:creationId xmlns:a16="http://schemas.microsoft.com/office/drawing/2014/main" id="{AF2BE95B-DDF1-5FBC-254E-875503A29DC2}"/>
+                <a16:creationId xmlns:a16="http://schemas.microsoft.com/office/drawing/2014/main" id="{D4D9A633-B242-3995-5FEC-691672AE0203}"/>
               </a:ext>
             </a:extLst>
           </p:cNvPr>
@@ -8114,14 +8744,19 @@
             <p:ph type="title"/>
           </p:nvPr>
         </p:nvSpPr>
-        <p:spPr/>
+        <p:spPr>
+          <a:xfrm>
+            <a:off x="406842" y="219456"/>
+            <a:ext cx="10058400" cy="1371600"/>
+          </a:xfrm>
+        </p:spPr>
         <p:txBody>
           <a:bodyPr/>
           <a:lstStyle/>
           <a:p>
             <a:r>
               <a:rPr lang="en-GB" dirty="0"/>
-              <a:t>Run the report generating pipeline</a:t>
+              <a:t>Annotation pipeline FAQ</a:t>
             </a:r>
           </a:p>
         </p:txBody>
@@ -8131,7 +8766,7 @@
           <p:cNvPr id="3" name="Content Placeholder 2">
             <a:extLst>
               <a:ext uri="{FF2B5EF4-FFF2-40B4-BE49-F238E27FC236}">
-                <a16:creationId xmlns:a16="http://schemas.microsoft.com/office/drawing/2014/main" id="{382E34FA-2F10-59F2-D739-E3D164821BD2}"/>
+                <a16:creationId xmlns:a16="http://schemas.microsoft.com/office/drawing/2014/main" id="{8BAE9DD2-566A-5F69-8556-D3679CFD96FB}"/>
               </a:ext>
             </a:extLst>
           </p:cNvPr>
@@ -8144,8 +8779,8 @@
         </p:nvSpPr>
         <p:spPr>
           <a:xfrm>
-            <a:off x="1066800" y="1735567"/>
-            <a:ext cx="10058400" cy="3849624"/>
+            <a:off x="552617" y="1160890"/>
+            <a:ext cx="10572584" cy="4791854"/>
           </a:xfrm>
         </p:spPr>
         <p:txBody>
@@ -8155,408 +8790,299 @@
           <a:lstStyle/>
           <a:p>
             <a:r>
-              <a:rPr lang="en-GB" sz="1100" dirty="0">
-                <a:latin typeface="Courier New" panose="02070309020205020404" pitchFamily="49" charset="0"/>
-                <a:cs typeface="Courier New" panose="02070309020205020404" pitchFamily="49" charset="0"/>
-              </a:rPr>
-              <a:t>This process is to create statistical reports that are normally used by the IMPC working groups</a:t>
-            </a:r>
-          </a:p>
-          <a:p>
-            <a:r>
-              <a:rPr lang="en-GB" sz="1100" dirty="0">
-                <a:latin typeface="Courier New" panose="02070309020205020404" pitchFamily="49" charset="0"/>
-                <a:cs typeface="Courier New" panose="02070309020205020404" pitchFamily="49" charset="0"/>
-              </a:rPr>
-              <a:t>Step:</a:t>
-            </a:r>
-          </a:p>
-          <a:p>
-            <a:pPr marL="617220" lvl="1" indent="-342900">
-              <a:buFont typeface="+mj-lt"/>
-              <a:buAutoNum type="arabicPeriod"/>
-            </a:pPr>
-            <a:r>
-              <a:rPr lang="en-GB" sz="1100" dirty="0">
-                <a:latin typeface="Courier New" panose="02070309020205020404" pitchFamily="49" charset="0"/>
-                <a:cs typeface="Courier New" panose="02070309020205020404" pitchFamily="49" charset="0"/>
-              </a:rPr>
-              <a:t>Navigate to :/</a:t>
-            </a:r>
-            <a:r>
-              <a:rPr lang="en-GB" sz="1100" dirty="0" err="1">
-                <a:latin typeface="Courier New" panose="02070309020205020404" pitchFamily="49" charset="0"/>
-                <a:cs typeface="Courier New" panose="02070309020205020404" pitchFamily="49" charset="0"/>
-              </a:rPr>
-              <a:t>nfs</a:t>
-            </a:r>
-            <a:r>
-              <a:rPr lang="en-GB" sz="1100" dirty="0">
-                <a:latin typeface="Courier New" panose="02070309020205020404" pitchFamily="49" charset="0"/>
-                <a:cs typeface="Courier New" panose="02070309020205020404" pitchFamily="49" charset="0"/>
-              </a:rPr>
+              <a:rPr lang="en-GB" b="1" dirty="0"/>
+              <a:t>How to figure out that the pipeline is finished?</a:t>
+            </a:r>
+          </a:p>
+          <a:p>
+            <a:pPr lvl="1"/>
+            <a:r>
+              <a:rPr lang="en-GB" dirty="0"/>
+              <a:t>When there is no job running on the cluster</a:t>
+            </a:r>
+          </a:p>
+          <a:p>
+            <a:r>
+              <a:rPr lang="en-GB" b="1" dirty="0"/>
+              <a:t>Where on the Hadoop cluster are files?(this path should be passed to Federico)</a:t>
+            </a:r>
+          </a:p>
+          <a:p>
+            <a:pPr lvl="1"/>
+            <a:r>
+              <a:rPr lang="en-GB" dirty="0"/>
+              <a:t>They are in (*</a:t>
+            </a:r>
+            <a:r>
+              <a:rPr lang="en-GB" b="1" dirty="0"/>
+              <a:t>YYY</a:t>
+            </a:r>
+            <a:r>
+              <a:rPr lang="en-GB" dirty="0"/>
+              <a:t>)Hadoop:/</a:t>
+            </a:r>
+            <a:r>
+              <a:rPr lang="en-GB" dirty="0" err="1"/>
+              <a:t>hadoop</a:t>
+            </a:r>
+            <a:r>
+              <a:rPr lang="en-GB" dirty="0"/>
+              <a:t>/user/</a:t>
+            </a:r>
+            <a:r>
+              <a:rPr lang="en-GB" dirty="0" err="1"/>
+              <a:t>mi_stats</a:t>
+            </a:r>
+            <a:r>
+              <a:rPr lang="en-GB" dirty="0"/>
+              <a:t>/</a:t>
+            </a:r>
+            <a:r>
+              <a:rPr lang="en-GB" dirty="0" err="1"/>
+              <a:t>impc</a:t>
+            </a:r>
+            <a:r>
+              <a:rPr lang="en-GB" dirty="0"/>
+              <a:t>/</a:t>
+            </a:r>
+            <a:r>
+              <a:rPr lang="en-GB" dirty="0" err="1"/>
+              <a:t>statpackets</a:t>
+            </a:r>
+            <a:r>
+              <a:rPr lang="en-GB" dirty="0"/>
+              <a:t>/DRXX.YY/ [a date in </a:t>
+            </a:r>
+            <a:r>
+              <a:rPr lang="en-GB" dirty="0" err="1"/>
+              <a:t>dmyyyy</a:t>
+            </a:r>
+            <a:r>
+              <a:rPr lang="en-GB" dirty="0"/>
+              <a:t> format]</a:t>
+            </a:r>
+          </a:p>
+          <a:p>
+            <a:r>
+              <a:rPr lang="en-GB" b="1" dirty="0"/>
+              <a:t>How to figure out if a file has not been transferred (successfully) to the Hadoop cluster?</a:t>
+            </a:r>
+          </a:p>
+          <a:p>
+            <a:pPr lvl="1"/>
+            <a:r>
+              <a:rPr lang="en-GB" dirty="0"/>
+              <a:t>If a file in </a:t>
+            </a:r>
+            <a:r>
+              <a:rPr lang="en-GB" b="1" dirty="0"/>
+              <a:t>ZZZ*</a:t>
+            </a:r>
+            <a:r>
+              <a:rPr lang="en-GB" dirty="0"/>
+              <a:t> directory is </a:t>
+            </a:r>
+            <a:r>
+              <a:rPr lang="en-GB" i="1" dirty="0" err="1"/>
+              <a:t>gzipped</a:t>
+            </a:r>
+            <a:r>
+              <a:rPr lang="en-GB" dirty="0"/>
+              <a:t> then it has been successfully transferred</a:t>
+            </a:r>
+          </a:p>
+          <a:p>
+            <a:pPr lvl="1"/>
+            <a:r>
+              <a:rPr lang="en-GB" sz="1050" b="1" dirty="0"/>
+              <a:t>*</a:t>
+            </a:r>
+            <a:r>
+              <a:rPr lang="en-GB" sz="1050" b="1" dirty="0" err="1"/>
+              <a:t>ZZZ.Codon:nfs</a:t>
+            </a:r>
+            <a:r>
+              <a:rPr lang="en-GB" sz="1050" b="1" dirty="0"/>
               <a:t>/production/</a:t>
             </a:r>
             <a:r>
-              <a:rPr lang="en-GB" sz="1100" dirty="0" err="1">
-                <a:latin typeface="Courier New" panose="02070309020205020404" pitchFamily="49" charset="0"/>
-                <a:cs typeface="Courier New" panose="02070309020205020404" pitchFamily="49" charset="0"/>
-              </a:rPr>
+              <a:rPr lang="en-GB" sz="1050" b="1" dirty="0" err="1"/>
               <a:t>tudor</a:t>
             </a:r>
             <a:r>
-              <a:rPr lang="en-GB" sz="1100" dirty="0">
-                <a:latin typeface="Courier New" panose="02070309020205020404" pitchFamily="49" charset="0"/>
-                <a:cs typeface="Courier New" panose="02070309020205020404" pitchFamily="49" charset="0"/>
-              </a:rPr>
+              <a:rPr lang="en-GB" sz="1050" b="1" dirty="0"/>
               <a:t>/</a:t>
             </a:r>
             <a:r>
-              <a:rPr lang="en-GB" sz="1100" dirty="0" err="1">
-                <a:latin typeface="Courier New" panose="02070309020205020404" pitchFamily="49" charset="0"/>
-                <a:cs typeface="Courier New" panose="02070309020205020404" pitchFamily="49" charset="0"/>
-              </a:rPr>
+              <a:rPr lang="en-GB" sz="1050" b="1" dirty="0" err="1"/>
               <a:t>komp</a:t>
             </a:r>
             <a:r>
-              <a:rPr lang="en-GB" sz="1100" dirty="0">
-                <a:latin typeface="Courier New" panose="02070309020205020404" pitchFamily="49" charset="0"/>
-                <a:cs typeface="Courier New" panose="02070309020205020404" pitchFamily="49" charset="0"/>
-              </a:rPr>
+              <a:rPr lang="en-GB" sz="1050" b="1" dirty="0"/>
               <a:t>/</a:t>
             </a:r>
             <a:r>
-              <a:rPr lang="en-GB" sz="1100" dirty="0" err="1">
-                <a:latin typeface="Courier New" panose="02070309020205020404" pitchFamily="49" charset="0"/>
-                <a:cs typeface="Courier New" panose="02070309020205020404" pitchFamily="49" charset="0"/>
-              </a:rPr>
+              <a:rPr lang="en-GB" sz="1050" b="1" dirty="0" err="1"/>
               <a:t>impc_statistical_pipeline</a:t>
             </a:r>
             <a:r>
-              <a:rPr lang="en-GB" sz="1100" dirty="0">
-                <a:latin typeface="Courier New" panose="02070309020205020404" pitchFamily="49" charset="0"/>
-                <a:cs typeface="Courier New" panose="02070309020205020404" pitchFamily="49" charset="0"/>
-              </a:rPr>
+              <a:rPr lang="en-GB" sz="1050" b="1" dirty="0"/>
               <a:t>/IMPC_DRs/</a:t>
             </a:r>
             <a:r>
-              <a:rPr lang="en-GB" sz="1100" b="1" dirty="0" err="1">
-                <a:latin typeface="Courier New" panose="02070309020205020404" pitchFamily="49" charset="0"/>
-                <a:cs typeface="Courier New" panose="02070309020205020404" pitchFamily="49" charset="0"/>
-              </a:rPr>
-              <a:t>stats_pipeline_input_drXX.y</a:t>
-            </a:r>
-            <a:r>
-              <a:rPr lang="en-GB" sz="1100" dirty="0">
-                <a:latin typeface="Courier New" panose="02070309020205020404" pitchFamily="49" charset="0"/>
-                <a:cs typeface="Courier New" panose="02070309020205020404" pitchFamily="49" charset="0"/>
-              </a:rPr>
+              <a:rPr lang="en-GB" sz="1050" b="1" dirty="0" err="1"/>
+              <a:t>stats_pipeline_input_drXX.YY</a:t>
+            </a:r>
+            <a:r>
+              <a:rPr lang="en-GB" sz="1050" b="1" dirty="0"/>
               <a:t>/SP/jobs/</a:t>
             </a:r>
             <a:r>
-              <a:rPr lang="en-GB" sz="1100" dirty="0" err="1">
-                <a:latin typeface="Courier New" panose="02070309020205020404" pitchFamily="49" charset="0"/>
-                <a:cs typeface="Courier New" panose="02070309020205020404" pitchFamily="49" charset="0"/>
-              </a:rPr>
+              <a:rPr lang="en-GB" sz="1050" b="1" dirty="0" err="1"/>
               <a:t>Results_IMPC_SP_Windowed</a:t>
             </a:r>
-            <a:endParaRPr lang="en-GB" sz="1100" dirty="0">
-              <a:latin typeface="Courier New" panose="02070309020205020404" pitchFamily="49" charset="0"/>
-              <a:cs typeface="Courier New" panose="02070309020205020404" pitchFamily="49" charset="0"/>
-            </a:endParaRPr>
-          </a:p>
-          <a:p>
-            <a:pPr marL="617220" lvl="1" indent="-342900">
-              <a:buFont typeface="+mj-lt"/>
-              <a:buAutoNum type="arabicPeriod"/>
-            </a:pPr>
-            <a:r>
-              <a:rPr lang="en-GB" sz="1100" dirty="0">
-                <a:latin typeface="Courier New" panose="02070309020205020404" pitchFamily="49" charset="0"/>
-                <a:cs typeface="Courier New" panose="02070309020205020404" pitchFamily="49" charset="0"/>
-              </a:rPr>
-              <a:t>Allocate a high memory machine on cluster and initialise an interactive shell by following the following command: </a:t>
-            </a:r>
-            <a:r>
-              <a:rPr lang="en-GB" sz="1100" dirty="0" err="1">
-                <a:latin typeface="Courier New" panose="02070309020205020404" pitchFamily="49" charset="0"/>
-                <a:cs typeface="Courier New" panose="02070309020205020404" pitchFamily="49" charset="0"/>
-              </a:rPr>
-              <a:t>bsub</a:t>
-            </a:r>
-            <a:r>
-              <a:rPr lang="en-GB" sz="1100" dirty="0">
-                <a:latin typeface="Courier New" panose="02070309020205020404" pitchFamily="49" charset="0"/>
-                <a:cs typeface="Courier New" panose="02070309020205020404" pitchFamily="49" charset="0"/>
-              </a:rPr>
-              <a:t> –M 52000 –e </a:t>
-            </a:r>
-            <a:r>
-              <a:rPr lang="en-GB" sz="1100" dirty="0" err="1">
-                <a:latin typeface="Courier New" panose="02070309020205020404" pitchFamily="49" charset="0"/>
-                <a:cs typeface="Courier New" panose="02070309020205020404" pitchFamily="49" charset="0"/>
-              </a:rPr>
-              <a:t>errReportGeneratingPipeline</a:t>
-            </a:r>
-            <a:r>
-              <a:rPr lang="en-GB" sz="1100" dirty="0">
-                <a:latin typeface="Courier New" panose="02070309020205020404" pitchFamily="49" charset="0"/>
-                <a:cs typeface="Courier New" panose="02070309020205020404" pitchFamily="49" charset="0"/>
-              </a:rPr>
-              <a:t> –o </a:t>
-            </a:r>
-            <a:r>
-              <a:rPr lang="en-GB" sz="1100" dirty="0" err="1">
-                <a:latin typeface="Courier New" panose="02070309020205020404" pitchFamily="49" charset="0"/>
-                <a:cs typeface="Courier New" panose="02070309020205020404" pitchFamily="49" charset="0"/>
-              </a:rPr>
-              <a:t>outReportGeneratingPipeline</a:t>
-            </a:r>
-            <a:r>
-              <a:rPr lang="en-GB" sz="1100" dirty="0">
-                <a:latin typeface="Courier New" panose="02070309020205020404" pitchFamily="49" charset="0"/>
-                <a:cs typeface="Courier New" panose="02070309020205020404" pitchFamily="49" charset="0"/>
-              </a:rPr>
-              <a:t> –Is /bin/bash</a:t>
-            </a:r>
-          </a:p>
-          <a:p>
-            <a:pPr marL="617220" lvl="1" indent="-342900">
-              <a:buFont typeface="+mj-lt"/>
-              <a:buAutoNum type="arabicPeriod"/>
-            </a:pPr>
-            <a:r>
-              <a:rPr lang="en-GB" sz="1100" dirty="0">
-                <a:latin typeface="Courier New" panose="02070309020205020404" pitchFamily="49" charset="0"/>
-                <a:cs typeface="Courier New" panose="02070309020205020404" pitchFamily="49" charset="0"/>
-              </a:rPr>
-              <a:t>Open an R session by typing R in your console (you need to make sure that this session is alive during the process or you can make a screen to keep it alive)</a:t>
-            </a:r>
-          </a:p>
-          <a:p>
-            <a:pPr marL="617220" lvl="1" indent="-342900">
-              <a:buFont typeface="+mj-lt"/>
-              <a:buAutoNum type="arabicPeriod"/>
-            </a:pPr>
-            <a:r>
-              <a:rPr lang="en-GB" sz="1100" dirty="0">
-                <a:latin typeface="Courier New" panose="02070309020205020404" pitchFamily="49" charset="0"/>
-                <a:cs typeface="Courier New" panose="02070309020205020404" pitchFamily="49" charset="0"/>
-              </a:rPr>
-              <a:t>Run the following commands in the R session:</a:t>
+            <a:r>
+              <a:rPr lang="en-GB" sz="1050" b="1" dirty="0"/>
+              <a:t>/</a:t>
+            </a:r>
+            <a:r>
+              <a:rPr lang="en-GB" sz="1050" b="1" dirty="0" err="1"/>
+              <a:t>AnnotationExtractorAndHadoopLoader</a:t>
+            </a:r>
+            <a:r>
+              <a:rPr lang="en-GB" sz="1050" b="1" dirty="0"/>
+              <a:t>/tmp</a:t>
+            </a:r>
+          </a:p>
+          <a:p>
+            <a:r>
+              <a:rPr lang="en-GB" b="1" dirty="0"/>
+              <a:t>How to transfer the failed files into Hadoop?</a:t>
+            </a:r>
+          </a:p>
+          <a:p>
+            <a:pPr lvl="1"/>
+            <a:r>
+              <a:rPr lang="en-GB" dirty="0"/>
+              <a:t>First cd  to </a:t>
+            </a:r>
+            <a:r>
+              <a:rPr lang="en-GB" b="1" dirty="0"/>
+              <a:t>ZZZ</a:t>
+            </a:r>
+            <a:r>
+              <a:rPr lang="en-GB" dirty="0"/>
+              <a:t> (see above path) and move the </a:t>
+            </a:r>
+            <a:r>
+              <a:rPr lang="en-GB" b="1" dirty="0"/>
+              <a:t>not</a:t>
+            </a:r>
+            <a:r>
+              <a:rPr lang="en-GB" dirty="0"/>
+              <a:t> </a:t>
+            </a:r>
+            <a:r>
+              <a:rPr lang="en-GB" dirty="0" err="1"/>
+              <a:t>gzipped</a:t>
+            </a:r>
+            <a:r>
+              <a:rPr lang="en-GB" dirty="0"/>
+              <a:t> files into </a:t>
+            </a:r>
+            <a:r>
+              <a:rPr lang="en-GB" b="1" dirty="0"/>
+              <a:t>YYY</a:t>
+            </a:r>
+            <a:r>
+              <a:rPr lang="en-GB" dirty="0"/>
+              <a:t> using SCP command.</a:t>
+            </a:r>
+          </a:p>
+          <a:p>
+            <a:pPr lvl="1"/>
+            <a:r>
+              <a:rPr lang="en-GB" sz="1100" dirty="0"/>
+              <a:t>Alternatively, you can run the following command in R (make sure that you open an R session in the </a:t>
+            </a:r>
+            <a:r>
+              <a:rPr lang="en-GB" sz="1100" b="1" dirty="0"/>
+              <a:t>ZZZ</a:t>
+            </a:r>
+            <a:r>
+              <a:rPr lang="en-GB" sz="1100" dirty="0"/>
+              <a:t> directory)</a:t>
             </a:r>
           </a:p>
           <a:p>
             <a:pPr lvl="2"/>
             <a:r>
-              <a:rPr lang="en-GB" sz="1100" dirty="0" err="1">
-                <a:latin typeface="Courier New" panose="02070309020205020404" pitchFamily="49" charset="0"/>
-                <a:cs typeface="Courier New" panose="02070309020205020404" pitchFamily="49" charset="0"/>
-              </a:rPr>
+              <a:rPr lang="en-GB" sz="1050" dirty="0" err="1"/>
               <a:t>DRrequiredAgeing</a:t>
             </a:r>
             <a:r>
-              <a:rPr lang="en-GB" sz="1100" dirty="0">
-                <a:latin typeface="Courier New" panose="02070309020205020404" pitchFamily="49" charset="0"/>
-                <a:cs typeface="Courier New" panose="02070309020205020404" pitchFamily="49" charset="0"/>
-              </a:rPr>
+              <a:rPr lang="en-GB" sz="1050" dirty="0"/>
               <a:t>:::</a:t>
             </a:r>
             <a:r>
-              <a:rPr lang="en-GB" sz="1100" dirty="0" err="1">
-                <a:latin typeface="Courier New" panose="02070309020205020404" pitchFamily="49" charset="0"/>
-                <a:cs typeface="Courier New" panose="02070309020205020404" pitchFamily="49" charset="0"/>
-              </a:rPr>
-              <a:t>IMPC_statspipelinePostProcess</a:t>
-            </a:r>
-            <a:r>
-              <a:rPr lang="en-GB" sz="1100" dirty="0">
-                <a:latin typeface="Courier New" panose="02070309020205020404" pitchFamily="49" charset="0"/>
-                <a:cs typeface="Courier New" panose="02070309020205020404" pitchFamily="49" charset="0"/>
-              </a:rPr>
-              <a:t>()</a:t>
-            </a:r>
-          </a:p>
-          <a:p>
-            <a:pPr lvl="2"/>
-            <a:r>
-              <a:rPr lang="en-GB" sz="1100" dirty="0" err="1">
-                <a:latin typeface="Courier New" panose="02070309020205020404" pitchFamily="49" charset="0"/>
-                <a:cs typeface="Courier New" panose="02070309020205020404" pitchFamily="49" charset="0"/>
-              </a:rPr>
-              <a:t>ClearReportsAfterCreation</a:t>
-            </a:r>
-            <a:r>
-              <a:rPr lang="en-GB" sz="1100" dirty="0">
-                <a:latin typeface="Courier New" panose="02070309020205020404" pitchFamily="49" charset="0"/>
-                <a:cs typeface="Courier New" panose="02070309020205020404" pitchFamily="49" charset="0"/>
-              </a:rPr>
-              <a:t>()</a:t>
-            </a:r>
+              <a:rPr lang="en-GB" sz="1050" dirty="0" err="1"/>
+              <a:t>HadoopReTransferSCP</a:t>
+            </a:r>
+            <a:r>
+              <a:rPr lang="en-GB" sz="1050" dirty="0"/>
+              <a:t>(prefix=‘DRXX.YY/</a:t>
+            </a:r>
+            <a:r>
+              <a:rPr lang="en-GB" sz="1050" b="1" dirty="0" err="1"/>
+              <a:t>tmpDir</a:t>
+            </a:r>
+            <a:r>
+              <a:rPr lang="en-GB" sz="1050" dirty="0"/>
+              <a:t>’)</a:t>
+            </a:r>
+          </a:p>
+          <a:p>
+            <a:pPr lvl="3"/>
+            <a:r>
+              <a:rPr lang="en-GB" sz="1050" dirty="0"/>
+              <a:t>Using the command above will clean up all .</a:t>
+            </a:r>
+            <a:r>
+              <a:rPr lang="en-GB" sz="1050" dirty="0" err="1"/>
+              <a:t>gz</a:t>
+            </a:r>
+            <a:r>
+              <a:rPr lang="en-GB" sz="1050" dirty="0"/>
+              <a:t> files (which were already transferred successfully) from the directory and transfer the other files into a directory </a:t>
+            </a:r>
+            <a:r>
+              <a:rPr lang="en-GB" sz="1050" b="1" dirty="0" err="1"/>
+              <a:t>tmpDir</a:t>
+            </a:r>
+            <a:r>
+              <a:rPr lang="en-GB" sz="1050" dirty="0"/>
+              <a:t> on Hadoop. Then I move the files into the </a:t>
+            </a:r>
+            <a:r>
+              <a:rPr lang="en-GB" sz="1050" b="1" dirty="0"/>
+              <a:t>YYY </a:t>
+            </a:r>
+            <a:r>
+              <a:rPr lang="en-GB" sz="1050" dirty="0"/>
+              <a:t>directory</a:t>
+            </a:r>
+            <a:r>
+              <a:rPr lang="en-GB" sz="1050" b="1" dirty="0"/>
+              <a:t>. The reason I do not transfer them directly to YYY is that the Hadoop HDFS does not allow rewriting files and if the file is already there, then the process will fail.</a:t>
+            </a:r>
+          </a:p>
+          <a:p>
+            <a:pPr lvl="3"/>
+            <a:endParaRPr lang="en-GB" sz="1050" dirty="0"/>
           </a:p>
           <a:p>
             <a:pPr lvl="1"/>
-            <a:r>
-              <a:rPr lang="en-GB" sz="1100" b="1" dirty="0">
-                <a:solidFill>
-                  <a:srgbClr val="2C481F"/>
-                </a:solidFill>
-                <a:latin typeface="Courier New" panose="02070309020205020404" pitchFamily="49" charset="0"/>
-                <a:cs typeface="Courier New" panose="02070309020205020404" pitchFamily="49" charset="0"/>
-              </a:rPr>
-              <a:t>► The </a:t>
-            </a:r>
-            <a:r>
-              <a:rPr lang="en-GB" sz="1100" b="1" kern="1200" dirty="0">
-                <a:solidFill>
-                  <a:srgbClr val="2C481F"/>
-                </a:solidFill>
-                <a:effectLst/>
-                <a:latin typeface="Courier New" panose="02070309020205020404" pitchFamily="49" charset="0"/>
-                <a:cs typeface="Courier New" panose="02070309020205020404" pitchFamily="49" charset="0"/>
-              </a:rPr>
-              <a:t>commands above will generate two csv files in the </a:t>
-            </a:r>
-            <a:r>
-              <a:rPr lang="en-GB" sz="1100" dirty="0">
-                <a:latin typeface="Courier New" panose="02070309020205020404" pitchFamily="49" charset="0"/>
-                <a:cs typeface="Courier New" panose="02070309020205020404" pitchFamily="49" charset="0"/>
-              </a:rPr>
-              <a:t>:/</a:t>
-            </a:r>
-            <a:r>
-              <a:rPr lang="en-GB" sz="1100" dirty="0" err="1">
-                <a:latin typeface="Courier New" panose="02070309020205020404" pitchFamily="49" charset="0"/>
-                <a:cs typeface="Courier New" panose="02070309020205020404" pitchFamily="49" charset="0"/>
-              </a:rPr>
-              <a:t>nfs</a:t>
-            </a:r>
-            <a:r>
-              <a:rPr lang="en-GB" sz="1100" dirty="0">
-                <a:latin typeface="Courier New" panose="02070309020205020404" pitchFamily="49" charset="0"/>
-                <a:cs typeface="Courier New" panose="02070309020205020404" pitchFamily="49" charset="0"/>
-              </a:rPr>
-              <a:t>/production/</a:t>
-            </a:r>
-            <a:r>
-              <a:rPr lang="en-GB" sz="1100" dirty="0" err="1">
-                <a:latin typeface="Courier New" panose="02070309020205020404" pitchFamily="49" charset="0"/>
-                <a:cs typeface="Courier New" panose="02070309020205020404" pitchFamily="49" charset="0"/>
-              </a:rPr>
-              <a:t>tudor</a:t>
-            </a:r>
-            <a:r>
-              <a:rPr lang="en-GB" sz="1100" dirty="0">
-                <a:latin typeface="Courier New" panose="02070309020205020404" pitchFamily="49" charset="0"/>
-                <a:cs typeface="Courier New" panose="02070309020205020404" pitchFamily="49" charset="0"/>
-              </a:rPr>
-              <a:t>/</a:t>
-            </a:r>
-            <a:r>
-              <a:rPr lang="en-GB" sz="1100" dirty="0" err="1">
-                <a:latin typeface="Courier New" panose="02070309020205020404" pitchFamily="49" charset="0"/>
-                <a:cs typeface="Courier New" panose="02070309020205020404" pitchFamily="49" charset="0"/>
-              </a:rPr>
-              <a:t>komp</a:t>
-            </a:r>
-            <a:r>
-              <a:rPr lang="en-GB" sz="1100" dirty="0">
-                <a:latin typeface="Courier New" panose="02070309020205020404" pitchFamily="49" charset="0"/>
-                <a:cs typeface="Courier New" panose="02070309020205020404" pitchFamily="49" charset="0"/>
-              </a:rPr>
-              <a:t>/</a:t>
-            </a:r>
-            <a:r>
-              <a:rPr lang="en-GB" sz="1100" dirty="0" err="1">
-                <a:latin typeface="Courier New" panose="02070309020205020404" pitchFamily="49" charset="0"/>
-                <a:cs typeface="Courier New" panose="02070309020205020404" pitchFamily="49" charset="0"/>
-              </a:rPr>
-              <a:t>impc_statistical_pipeline</a:t>
-            </a:r>
-            <a:r>
-              <a:rPr lang="en-GB" sz="1100" dirty="0">
-                <a:latin typeface="Courier New" panose="02070309020205020404" pitchFamily="49" charset="0"/>
-                <a:cs typeface="Courier New" panose="02070309020205020404" pitchFamily="49" charset="0"/>
-              </a:rPr>
-              <a:t>/IMPC_DRs/</a:t>
-            </a:r>
-            <a:r>
-              <a:rPr lang="en-GB" sz="1100" b="1" dirty="0" err="1">
-                <a:latin typeface="Courier New" panose="02070309020205020404" pitchFamily="49" charset="0"/>
-                <a:cs typeface="Courier New" panose="02070309020205020404" pitchFamily="49" charset="0"/>
-              </a:rPr>
-              <a:t>stats_pipeline_input_drXX.y</a:t>
-            </a:r>
-            <a:r>
-              <a:rPr lang="en-GB" sz="1100" dirty="0">
-                <a:latin typeface="Courier New" panose="02070309020205020404" pitchFamily="49" charset="0"/>
-                <a:cs typeface="Courier New" panose="02070309020205020404" pitchFamily="49" charset="0"/>
-              </a:rPr>
-              <a:t>/SP/jobs/</a:t>
-            </a:r>
-            <a:r>
-              <a:rPr lang="en-GB" sz="1100" dirty="0" err="1">
-                <a:latin typeface="Courier New" panose="02070309020205020404" pitchFamily="49" charset="0"/>
-                <a:cs typeface="Courier New" panose="02070309020205020404" pitchFamily="49" charset="0"/>
-              </a:rPr>
-              <a:t>Results_IMPC_SP_Windowed</a:t>
-            </a:r>
-            <a:r>
-              <a:rPr lang="en-GB" sz="1100" dirty="0">
-                <a:latin typeface="Courier New" panose="02070309020205020404" pitchFamily="49" charset="0"/>
-                <a:cs typeface="Courier New" panose="02070309020205020404" pitchFamily="49" charset="0"/>
-              </a:rPr>
-              <a:t> directory for the </a:t>
-            </a:r>
-            <a:r>
-              <a:rPr lang="en-GB" sz="1100" b="1" dirty="0" err="1">
-                <a:latin typeface="Courier New" panose="02070309020205020404" pitchFamily="49" charset="0"/>
-                <a:cs typeface="Courier New" panose="02070309020205020404" pitchFamily="49" charset="0"/>
-              </a:rPr>
-              <a:t>unidimentional</a:t>
-            </a:r>
-            <a:r>
-              <a:rPr lang="en-GB" sz="1100" dirty="0">
-                <a:latin typeface="Courier New" panose="02070309020205020404" pitchFamily="49" charset="0"/>
-                <a:cs typeface="Courier New" panose="02070309020205020404" pitchFamily="49" charset="0"/>
-              </a:rPr>
-              <a:t> and </a:t>
-            </a:r>
-            <a:r>
-              <a:rPr lang="en-GB" sz="1100" b="1" dirty="0">
-                <a:latin typeface="Courier New" panose="02070309020205020404" pitchFamily="49" charset="0"/>
-                <a:cs typeface="Courier New" panose="02070309020205020404" pitchFamily="49" charset="0"/>
-              </a:rPr>
-              <a:t>categorical</a:t>
-            </a:r>
-            <a:r>
-              <a:rPr lang="en-GB" sz="1100" dirty="0">
-                <a:latin typeface="Courier New" panose="02070309020205020404" pitchFamily="49" charset="0"/>
-                <a:cs typeface="Courier New" panose="02070309020205020404" pitchFamily="49" charset="0"/>
-              </a:rPr>
-              <a:t> results. The files can be </a:t>
-            </a:r>
-            <a:r>
-              <a:rPr lang="en-GB" sz="1100" b="1" dirty="0" err="1">
-                <a:latin typeface="Courier New" panose="02070309020205020404" pitchFamily="49" charset="0"/>
-                <a:cs typeface="Courier New" panose="02070309020205020404" pitchFamily="49" charset="0"/>
-              </a:rPr>
-              <a:t>gzip</a:t>
-            </a:r>
-            <a:r>
-              <a:rPr lang="en-GB" sz="1100" dirty="0">
-                <a:latin typeface="Courier New" panose="02070309020205020404" pitchFamily="49" charset="0"/>
-                <a:cs typeface="Courier New" panose="02070309020205020404" pitchFamily="49" charset="0"/>
-              </a:rPr>
-              <a:t> and moved to the FTP directory. You can decorate and format the files by using one of the formatted files in the previous data releases.</a:t>
-            </a:r>
-          </a:p>
-          <a:p>
-            <a:pPr lvl="2"/>
-            <a:endParaRPr lang="en-GB" sz="1400" dirty="0">
-              <a:latin typeface="Courier New" panose="02070309020205020404" pitchFamily="49" charset="0"/>
-              <a:cs typeface="Courier New" panose="02070309020205020404" pitchFamily="49" charset="0"/>
-            </a:endParaRPr>
+            <a:endParaRPr lang="en-GB" dirty="0"/>
           </a:p>
         </p:txBody>
       </p:sp>
@@ -8565,7 +9091,7 @@
           <p:cNvPr id="4" name="Date Placeholder 3">
             <a:extLst>
               <a:ext uri="{FF2B5EF4-FFF2-40B4-BE49-F238E27FC236}">
-                <a16:creationId xmlns:a16="http://schemas.microsoft.com/office/drawing/2014/main" id="{8E297709-FD23-B3A8-0B3B-3B60227D290E}"/>
+                <a16:creationId xmlns:a16="http://schemas.microsoft.com/office/drawing/2014/main" id="{6BE7F43F-5B2A-CE37-1825-07F4A63CE73F}"/>
               </a:ext>
             </a:extLst>
           </p:cNvPr>
@@ -8593,7 +9119,7 @@
     </p:spTree>
     <p:extLst>
       <p:ext uri="{BB962C8B-B14F-4D97-AF65-F5344CB8AC3E}">
-        <p14:creationId xmlns:p14="http://schemas.microsoft.com/office/powerpoint/2010/main" val="1791507408"/>
+        <p14:creationId xmlns:p14="http://schemas.microsoft.com/office/powerpoint/2010/main" val="270742275"/>
       </p:ext>
     </p:extLst>
   </p:cSld>

</xml_diff>